<commit_message>
fix errors in notes
</commit_message>
<xml_diff>
--- a/Agile_Softwareentwicklung_Automotive_PGPE_rico.pptx
+++ b/Agile_Softwareentwicklung_Automotive_PGPE_rico.pptx
@@ -9785,7 +9785,7 @@
           <a:p>
             <a:fld id="{CF93AEB5-C303-4762-90A0-AF697EB357C4}" type="datetimeFigureOut">
               <a:rPr lang="de-DE" smtClean="0"/>
-              <a:t>22.11.2022</a:t>
+              <a:t>25.11.2022</a:t>
             </a:fld>
             <a:endParaRPr lang="de-DE"/>
           </a:p>
@@ -36278,7 +36278,7 @@
           </a:prstGeom>
           <a:ln w="57150">
             <a:solidFill>
-              <a:srgbClr val="002896"/>
+              <a:schemeClr val="tx1"/>
             </a:solidFill>
           </a:ln>
         </p:spPr>

</xml_diff>